<commit_message>
Update CeTI Bloc 3
</commit_message>
<xml_diff>
--- a/CeTI/b3_photodetection/B3_1_Photodetection.pptx
+++ b/CeTI/b3_photodetection/B3_1_Photodetection.pptx
@@ -5,7 +5,7 @@
     <p:sldMasterId id="2147483711" r:id="rId1"/>
   </p:sldMasterIdLst>
   <p:notesMasterIdLst>
-    <p:notesMasterId r:id="rId10"/>
+    <p:notesMasterId r:id="rId11"/>
   </p:notesMasterIdLst>
   <p:sldIdLst>
     <p:sldId id="256" r:id="rId2"/>
@@ -16,6 +16,7 @@
     <p:sldId id="277" r:id="rId7"/>
     <p:sldId id="280" r:id="rId8"/>
     <p:sldId id="278" r:id="rId9"/>
+    <p:sldId id="281" r:id="rId10"/>
   </p:sldIdLst>
   <p:sldSz cx="12192000" cy="6858000"/>
   <p:notesSz cx="6858000" cy="9144000"/>
@@ -215,7 +216,7 @@
           <a:p>
             <a:fld id="{729C724E-499D-43AC-8699-CF969D2466FC}" type="datetimeFigureOut">
               <a:rPr lang="fr-FR" smtClean="0"/>
-              <a:t>20/07/2023</a:t>
+              <a:t>14/11/2023</a:t>
             </a:fld>
             <a:endParaRPr lang="fr-FR"/>
           </a:p>
@@ -986,6 +987,90 @@
 </p:notes>
 </file>
 
+<file path=ppt/notesSlides/notesSlide7.xml><?xml version="1.0" encoding="utf-8"?>
+<p:notes xmlns:a="http://schemas.openxmlformats.org/drawingml/2006/main" xmlns:r="http://schemas.openxmlformats.org/officeDocument/2006/relationships" xmlns:p="http://schemas.openxmlformats.org/presentationml/2006/main">
+  <p:cSld>
+    <p:spTree>
+      <p:nvGrpSpPr>
+        <p:cNvPr id="1" name=""/>
+        <p:cNvGrpSpPr/>
+        <p:nvPr/>
+      </p:nvGrpSpPr>
+      <p:grpSpPr>
+        <a:xfrm>
+          <a:off x="0" y="0"/>
+          <a:ext cx="0" cy="0"/>
+          <a:chOff x="0" y="0"/>
+          <a:chExt cx="0" cy="0"/>
+        </a:xfrm>
+      </p:grpSpPr>
+      <p:sp>
+        <p:nvSpPr>
+          <p:cNvPr id="2" name="Espace réservé de l'image des diapositives 1"/>
+          <p:cNvSpPr>
+            <a:spLocks noGrp="1" noRot="1" noChangeAspect="1"/>
+          </p:cNvSpPr>
+          <p:nvPr>
+            <p:ph type="sldImg"/>
+          </p:nvPr>
+        </p:nvSpPr>
+        <p:spPr/>
+      </p:sp>
+      <p:sp>
+        <p:nvSpPr>
+          <p:cNvPr id="3" name="Espace réservé des notes 2"/>
+          <p:cNvSpPr>
+            <a:spLocks noGrp="1"/>
+          </p:cNvSpPr>
+          <p:nvPr>
+            <p:ph type="body" idx="1"/>
+          </p:nvPr>
+        </p:nvSpPr>
+        <p:spPr/>
+        <p:txBody>
+          <a:bodyPr/>
+          <a:lstStyle/>
+          <a:p>
+            <a:endParaRPr lang="fr-FR" dirty="0"/>
+          </a:p>
+        </p:txBody>
+      </p:sp>
+      <p:sp>
+        <p:nvSpPr>
+          <p:cNvPr id="4" name="Espace réservé du numéro de diapositive 3"/>
+          <p:cNvSpPr>
+            <a:spLocks noGrp="1"/>
+          </p:cNvSpPr>
+          <p:nvPr>
+            <p:ph type="sldNum" sz="quarter" idx="5"/>
+          </p:nvPr>
+        </p:nvSpPr>
+        <p:spPr/>
+        <p:txBody>
+          <a:bodyPr/>
+          <a:lstStyle/>
+          <a:p>
+            <a:fld id="{6BDC53D4-8BF5-4FDD-81EC-7AC957B0D210}" type="slidenum">
+              <a:rPr lang="fr-FR" smtClean="0"/>
+              <a:t>9</a:t>
+            </a:fld>
+            <a:endParaRPr lang="fr-FR"/>
+          </a:p>
+        </p:txBody>
+      </p:sp>
+    </p:spTree>
+    <p:extLst>
+      <p:ext uri="{BB962C8B-B14F-4D97-AF65-F5344CB8AC3E}">
+        <p14:creationId xmlns:p14="http://schemas.microsoft.com/office/powerpoint/2010/main" val="526583109"/>
+      </p:ext>
+    </p:extLst>
+  </p:cSld>
+  <p:clrMapOvr>
+    <a:masterClrMapping/>
+  </p:clrMapOvr>
+</p:notes>
+</file>
+
 <file path=ppt/slideLayouts/slideLayout1.xml><?xml version="1.0" encoding="utf-8"?>
 <p:sldLayout xmlns:a="http://schemas.openxmlformats.org/drawingml/2006/main" xmlns:r="http://schemas.openxmlformats.org/officeDocument/2006/relationships" xmlns:p="http://schemas.openxmlformats.org/presentationml/2006/main" type="title" preserve="1">
   <p:cSld name="Title Slide">
@@ -1142,7 +1227,7 @@
           <a:p>
             <a:fld id="{02AC24A9-CCB6-4F8D-B8DB-C2F3692CFA5A}" type="datetimeFigureOut">
               <a:rPr lang="en-US" smtClean="0"/>
-              <a:t>7/20/2023</a:t>
+              <a:t>11/14/2023</a:t>
             </a:fld>
             <a:endParaRPr lang="en-US" dirty="0"/>
           </a:p>
@@ -1512,7 +1597,7 @@
           <a:p>
             <a:fld id="{02AC24A9-CCB6-4F8D-B8DB-C2F3692CFA5A}" type="datetimeFigureOut">
               <a:rPr lang="en-US" smtClean="0"/>
-              <a:t>7/20/2023</a:t>
+              <a:t>11/14/2023</a:t>
             </a:fld>
             <a:endParaRPr lang="en-US"/>
           </a:p>
@@ -1721,7 +1806,7 @@
           <a:p>
             <a:fld id="{02AC24A9-CCB6-4F8D-B8DB-C2F3692CFA5A}" type="datetimeFigureOut">
               <a:rPr lang="en-US" smtClean="0"/>
-              <a:t>7/20/2023</a:t>
+              <a:t>11/14/2023</a:t>
             </a:fld>
             <a:endParaRPr lang="en-US"/>
           </a:p>
@@ -2191,7 +2276,7 @@
           <a:p>
             <a:fld id="{02AC24A9-CCB6-4F8D-B8DB-C2F3692CFA5A}" type="datetimeFigureOut">
               <a:rPr lang="en-US" smtClean="0"/>
-              <a:t>7/20/2023</a:t>
+              <a:t>11/14/2023</a:t>
             </a:fld>
             <a:endParaRPr lang="en-US"/>
           </a:p>
@@ -2645,7 +2730,7 @@
           <a:p>
             <a:fld id="{02AC24A9-CCB6-4F8D-B8DB-C2F3692CFA5A}" type="datetimeFigureOut">
               <a:rPr lang="en-US" smtClean="0"/>
-              <a:t>7/20/2023</a:t>
+              <a:t>11/14/2023</a:t>
             </a:fld>
             <a:endParaRPr lang="en-US"/>
           </a:p>
@@ -3177,7 +3262,7 @@
           <a:p>
             <a:fld id="{02AC24A9-CCB6-4F8D-B8DB-C2F3692CFA5A}" type="datetimeFigureOut">
               <a:rPr lang="en-US" smtClean="0"/>
-              <a:t>7/20/2023</a:t>
+              <a:t>11/14/2023</a:t>
             </a:fld>
             <a:endParaRPr lang="en-US"/>
           </a:p>
@@ -3876,7 +3961,7 @@
           <a:p>
             <a:fld id="{02AC24A9-CCB6-4F8D-B8DB-C2F3692CFA5A}" type="datetimeFigureOut">
               <a:rPr lang="en-US" smtClean="0"/>
-              <a:t>7/20/2023</a:t>
+              <a:t>11/14/2023</a:t>
             </a:fld>
             <a:endParaRPr lang="en-US"/>
           </a:p>
@@ -4205,7 +4290,7 @@
           <a:p>
             <a:fld id="{02AC24A9-CCB6-4F8D-B8DB-C2F3692CFA5A}" type="datetimeFigureOut">
               <a:rPr lang="en-US" smtClean="0"/>
-              <a:t>7/20/2023</a:t>
+              <a:t>11/14/2023</a:t>
             </a:fld>
             <a:endParaRPr lang="en-US"/>
           </a:p>
@@ -4318,7 +4403,7 @@
           <a:p>
             <a:fld id="{02AC24A9-CCB6-4F8D-B8DB-C2F3692CFA5A}" type="datetimeFigureOut">
               <a:rPr lang="en-US" smtClean="0"/>
-              <a:t>7/20/2023</a:t>
+              <a:t>11/14/2023</a:t>
             </a:fld>
             <a:endParaRPr lang="en-US"/>
           </a:p>
@@ -4813,7 +4898,7 @@
           <a:p>
             <a:fld id="{02AC24A9-CCB6-4F8D-B8DB-C2F3692CFA5A}" type="datetimeFigureOut">
               <a:rPr lang="en-US" smtClean="0"/>
-              <a:t>7/20/2023</a:t>
+              <a:t>11/14/2023</a:t>
             </a:fld>
             <a:endParaRPr lang="en-US" dirty="0"/>
           </a:p>
@@ -5290,7 +5375,7 @@
           <a:p>
             <a:fld id="{02AC24A9-CCB6-4F8D-B8DB-C2F3692CFA5A}" type="datetimeFigureOut">
               <a:rPr lang="en-US" smtClean="0"/>
-              <a:t>7/20/2023</a:t>
+              <a:t>11/14/2023</a:t>
             </a:fld>
             <a:endParaRPr lang="en-US"/>
           </a:p>
@@ -5533,7 +5618,7 @@
           <a:p>
             <a:fld id="{02AC24A9-CCB6-4F8D-B8DB-C2F3692CFA5A}" type="datetimeFigureOut">
               <a:rPr lang="en-US" smtClean="0"/>
-              <a:t>7/20/2023</a:t>
+              <a:t>11/14/2023</a:t>
             </a:fld>
             <a:endParaRPr lang="en-US"/>
           </a:p>
@@ -6157,11 +6242,14 @@
           <a:lstStyle/>
           <a:p>
             <a:r>
-              <a:rPr lang="fr-FR" sz="4800" dirty="0">
+              <a:rPr lang="fr-FR" sz="4400" dirty="0" err="1">
                 <a:latin typeface="Bahnschrift SemiBold" panose="020B0502040204020203" pitchFamily="34" charset="0"/>
               </a:rPr>
-              <a:t>Filtrage actif</a:t>
-            </a:r>
+              <a:t>Photodétection</a:t>
+            </a:r>
+            <a:endParaRPr lang="fr-FR" sz="4400" dirty="0">
+              <a:latin typeface="Bahnschrift SemiBold" panose="020B0502040204020203" pitchFamily="34" charset="0"/>
+            </a:endParaRPr>
           </a:p>
         </p:txBody>
       </p:sp>
@@ -6214,7 +6302,7 @@
               <a:rPr lang="fr-FR" sz="2000" dirty="0">
                 <a:latin typeface="Bahnschrift Light" panose="020B0502040204020203" pitchFamily="34" charset="0"/>
               </a:rPr>
-              <a:t>Institut d’Optique / B1</a:t>
+              <a:t>Institut d’Optique / B3</a:t>
             </a:r>
           </a:p>
         </p:txBody>
@@ -8930,6 +9018,210 @@
     <p:extLst>
       <p:ext uri="{BB962C8B-B14F-4D97-AF65-F5344CB8AC3E}">
         <p14:creationId xmlns:p14="http://schemas.microsoft.com/office/powerpoint/2010/main" val="2414863005"/>
+      </p:ext>
+    </p:extLst>
+  </p:cSld>
+  <p:clrMapOvr>
+    <a:masterClrMapping/>
+  </p:clrMapOvr>
+</p:sld>
+</file>
+
+<file path=ppt/slides/slide9.xml><?xml version="1.0" encoding="utf-8"?>
+<p:sld xmlns:a="http://schemas.openxmlformats.org/drawingml/2006/main" xmlns:r="http://schemas.openxmlformats.org/officeDocument/2006/relationships" xmlns:p="http://schemas.openxmlformats.org/presentationml/2006/main">
+  <p:cSld>
+    <p:spTree>
+      <p:nvGrpSpPr>
+        <p:cNvPr id="1" name=""/>
+        <p:cNvGrpSpPr/>
+        <p:nvPr/>
+      </p:nvGrpSpPr>
+      <p:grpSpPr>
+        <a:xfrm>
+          <a:off x="0" y="0"/>
+          <a:ext cx="0" cy="0"/>
+          <a:chOff x="0" y="0"/>
+          <a:chExt cx="0" cy="0"/>
+        </a:xfrm>
+      </p:grpSpPr>
+      <p:sp>
+        <p:nvSpPr>
+          <p:cNvPr id="2" name="Titre 1">
+            <a:extLst>
+              <a:ext uri="{FF2B5EF4-FFF2-40B4-BE49-F238E27FC236}">
+                <a16:creationId xmlns:a16="http://schemas.microsoft.com/office/drawing/2014/main" id="{90162AE8-C1B0-5C56-8313-DEE494F38273}"/>
+              </a:ext>
+            </a:extLst>
+          </p:cNvPr>
+          <p:cNvSpPr>
+            <a:spLocks noGrp="1"/>
+          </p:cNvSpPr>
+          <p:nvPr>
+            <p:ph type="title"/>
+          </p:nvPr>
+        </p:nvSpPr>
+        <p:spPr/>
+        <p:txBody>
+          <a:bodyPr/>
+          <a:lstStyle/>
+          <a:p>
+            <a:r>
+              <a:rPr lang="fr-FR" dirty="0"/>
+              <a:t>M5 – Détecter un obstacle</a:t>
+            </a:r>
+          </a:p>
+        </p:txBody>
+      </p:sp>
+      <p:pic>
+        <p:nvPicPr>
+          <p:cNvPr id="5" name="Image 4" descr="Une image contenant texte&#10;&#10;Description générée automatiquement">
+            <a:extLst>
+              <a:ext uri="{FF2B5EF4-FFF2-40B4-BE49-F238E27FC236}">
+                <a16:creationId xmlns:a16="http://schemas.microsoft.com/office/drawing/2014/main" id="{204ADC40-1D61-539F-22ED-6B21D67FBDE6}"/>
+              </a:ext>
+            </a:extLst>
+          </p:cNvPr>
+          <p:cNvPicPr>
+            <a:picLocks noChangeAspect="1"/>
+          </p:cNvPicPr>
+          <p:nvPr/>
+        </p:nvPicPr>
+        <p:blipFill>
+          <a:blip r:embed="rId3" cstate="print">
+            <a:extLst>
+              <a:ext uri="{28A0092B-C50C-407E-A947-70E740481C1C}">
+                <a14:useLocalDpi xmlns:a14="http://schemas.microsoft.com/office/drawing/2010/main" val="0"/>
+              </a:ext>
+            </a:extLst>
+          </a:blip>
+          <a:stretch>
+            <a:fillRect/>
+          </a:stretch>
+        </p:blipFill>
+        <p:spPr>
+          <a:xfrm>
+            <a:off x="202922" y="5934456"/>
+            <a:ext cx="1825291" cy="749808"/>
+          </a:xfrm>
+          <a:prstGeom prst="rect">
+            <a:avLst/>
+          </a:prstGeom>
+        </p:spPr>
+      </p:pic>
+      <p:sp>
+        <p:nvSpPr>
+          <p:cNvPr id="6" name="Espace réservé du contenu 5">
+            <a:extLst>
+              <a:ext uri="{FF2B5EF4-FFF2-40B4-BE49-F238E27FC236}">
+                <a16:creationId xmlns:a16="http://schemas.microsoft.com/office/drawing/2014/main" id="{EB374F7D-2CBC-B44D-DA43-1AFF54FD0B48}"/>
+              </a:ext>
+            </a:extLst>
+          </p:cNvPr>
+          <p:cNvSpPr>
+            <a:spLocks noGrp="1"/>
+          </p:cNvSpPr>
+          <p:nvPr>
+            <p:ph sz="half" idx="1"/>
+          </p:nvPr>
+        </p:nvSpPr>
+        <p:spPr/>
+        <p:txBody>
+          <a:bodyPr/>
+          <a:lstStyle/>
+          <a:p>
+            <a:r>
+              <a:rPr lang="fr-FR" dirty="0"/>
+              <a:t>Capteurs TOF – Time of Flight</a:t>
+            </a:r>
+          </a:p>
+        </p:txBody>
+      </p:sp>
+      <p:pic>
+        <p:nvPicPr>
+          <p:cNvPr id="1026" name="Picture 2" descr="time of flight">
+            <a:extLst>
+              <a:ext uri="{FF2B5EF4-FFF2-40B4-BE49-F238E27FC236}">
+                <a16:creationId xmlns:a16="http://schemas.microsoft.com/office/drawing/2014/main" id="{3DC6B9BE-6608-58C3-C7F1-BA99BD3FEA9B}"/>
+              </a:ext>
+            </a:extLst>
+          </p:cNvPr>
+          <p:cNvPicPr>
+            <a:picLocks noChangeAspect="1" noChangeArrowheads="1"/>
+          </p:cNvPicPr>
+          <p:nvPr/>
+        </p:nvPicPr>
+        <p:blipFill>
+          <a:blip r:embed="rId4">
+            <a:extLst>
+              <a:ext uri="{28A0092B-C50C-407E-A947-70E740481C1C}">
+                <a14:useLocalDpi xmlns:a14="http://schemas.microsoft.com/office/drawing/2010/main" val="0"/>
+              </a:ext>
+            </a:extLst>
+          </a:blip>
+          <a:srcRect/>
+          <a:stretch>
+            <a:fillRect/>
+          </a:stretch>
+        </p:blipFill>
+        <p:spPr bwMode="auto">
+          <a:xfrm>
+            <a:off x="5822870" y="2100670"/>
+            <a:ext cx="5611586" cy="4208690"/>
+          </a:xfrm>
+          <a:prstGeom prst="rect">
+            <a:avLst/>
+          </a:prstGeom>
+          <a:noFill/>
+          <a:extLst>
+            <a:ext uri="{909E8E84-426E-40DD-AFC4-6F175D3DCCD1}">
+              <a14:hiddenFill xmlns:a14="http://schemas.microsoft.com/office/drawing/2010/main">
+                <a:solidFill>
+                  <a:srgbClr val="FFFFFF"/>
+                </a:solidFill>
+              </a14:hiddenFill>
+            </a:ext>
+          </a:extLst>
+        </p:spPr>
+      </p:pic>
+      <p:sp>
+        <p:nvSpPr>
+          <p:cNvPr id="4" name="ZoneTexte 3">
+            <a:extLst>
+              <a:ext uri="{FF2B5EF4-FFF2-40B4-BE49-F238E27FC236}">
+                <a16:creationId xmlns:a16="http://schemas.microsoft.com/office/drawing/2014/main" id="{65C6CDCE-AA88-6BC5-B453-C6ADEFD65E25}"/>
+              </a:ext>
+            </a:extLst>
+          </p:cNvPr>
+          <p:cNvSpPr txBox="1"/>
+          <p:nvPr/>
+        </p:nvSpPr>
+        <p:spPr>
+          <a:xfrm>
+            <a:off x="2544715" y="6376487"/>
+            <a:ext cx="7309833" cy="307777"/>
+          </a:xfrm>
+          <a:prstGeom prst="rect">
+            <a:avLst/>
+          </a:prstGeom>
+          <a:noFill/>
+        </p:spPr>
+        <p:txBody>
+          <a:bodyPr wrap="square">
+            <a:spAutoFit/>
+          </a:bodyPr>
+          <a:lstStyle/>
+          <a:p>
+            <a:r>
+              <a:rPr lang="fr-FR" sz="1400" dirty="0"/>
+              <a:t>https://www.st.com/en/imaging-and-photonics-solutions/time-of-flight-sensors.html</a:t>
+            </a:r>
+          </a:p>
+        </p:txBody>
+      </p:sp>
+    </p:spTree>
+    <p:extLst>
+      <p:ext uri="{BB962C8B-B14F-4D97-AF65-F5344CB8AC3E}">
+        <p14:creationId xmlns:p14="http://schemas.microsoft.com/office/powerpoint/2010/main" val="377664018"/>
       </p:ext>
     </p:extLst>
   </p:cSld>

</xml_diff>

<commit_message>
Update ONIP and CeTI
</commit_message>
<xml_diff>
--- a/CeTI/b3_photodetection/B3_1_Photodetection.pptx
+++ b/CeTI/b3_photodetection/B3_1_Photodetection.pptx
@@ -233,7 +233,7 @@
           <a:p>
             <a:fld id="{729C724E-499D-43AC-8699-CF969D2466FC}" type="datetimeFigureOut">
               <a:rPr lang="fr-FR" smtClean="0"/>
-              <a:t>08/12/2023</a:t>
+              <a:t>12/12/2023</a:t>
             </a:fld>
             <a:endParaRPr lang="fr-FR"/>
           </a:p>
@@ -2672,7 +2672,7 @@
           <a:p>
             <a:fld id="{02AC24A9-CCB6-4F8D-B8DB-C2F3692CFA5A}" type="datetimeFigureOut">
               <a:rPr lang="en-US" smtClean="0"/>
-              <a:t>12/8/2023</a:t>
+              <a:t>12/12/2023</a:t>
             </a:fld>
             <a:endParaRPr lang="en-US" dirty="0"/>
           </a:p>
@@ -3042,7 +3042,7 @@
           <a:p>
             <a:fld id="{02AC24A9-CCB6-4F8D-B8DB-C2F3692CFA5A}" type="datetimeFigureOut">
               <a:rPr lang="en-US" smtClean="0"/>
-              <a:t>12/8/2023</a:t>
+              <a:t>12/12/2023</a:t>
             </a:fld>
             <a:endParaRPr lang="en-US"/>
           </a:p>
@@ -3251,7 +3251,7 @@
           <a:p>
             <a:fld id="{02AC24A9-CCB6-4F8D-B8DB-C2F3692CFA5A}" type="datetimeFigureOut">
               <a:rPr lang="en-US" smtClean="0"/>
-              <a:t>12/8/2023</a:t>
+              <a:t>12/12/2023</a:t>
             </a:fld>
             <a:endParaRPr lang="en-US"/>
           </a:p>
@@ -3721,7 +3721,7 @@
           <a:p>
             <a:fld id="{02AC24A9-CCB6-4F8D-B8DB-C2F3692CFA5A}" type="datetimeFigureOut">
               <a:rPr lang="en-US" smtClean="0"/>
-              <a:t>12/8/2023</a:t>
+              <a:t>12/12/2023</a:t>
             </a:fld>
             <a:endParaRPr lang="en-US"/>
           </a:p>
@@ -4175,7 +4175,7 @@
           <a:p>
             <a:fld id="{02AC24A9-CCB6-4F8D-B8DB-C2F3692CFA5A}" type="datetimeFigureOut">
               <a:rPr lang="en-US" smtClean="0"/>
-              <a:t>12/8/2023</a:t>
+              <a:t>12/12/2023</a:t>
             </a:fld>
             <a:endParaRPr lang="en-US"/>
           </a:p>
@@ -4707,7 +4707,7 @@
           <a:p>
             <a:fld id="{02AC24A9-CCB6-4F8D-B8DB-C2F3692CFA5A}" type="datetimeFigureOut">
               <a:rPr lang="en-US" smtClean="0"/>
-              <a:t>12/8/2023</a:t>
+              <a:t>12/12/2023</a:t>
             </a:fld>
             <a:endParaRPr lang="en-US"/>
           </a:p>
@@ -5406,7 +5406,7 @@
           <a:p>
             <a:fld id="{02AC24A9-CCB6-4F8D-B8DB-C2F3692CFA5A}" type="datetimeFigureOut">
               <a:rPr lang="en-US" smtClean="0"/>
-              <a:t>12/8/2023</a:t>
+              <a:t>12/12/2023</a:t>
             </a:fld>
             <a:endParaRPr lang="en-US"/>
           </a:p>
@@ -5735,7 +5735,7 @@
           <a:p>
             <a:fld id="{02AC24A9-CCB6-4F8D-B8DB-C2F3692CFA5A}" type="datetimeFigureOut">
               <a:rPr lang="en-US" smtClean="0"/>
-              <a:t>12/8/2023</a:t>
+              <a:t>12/12/2023</a:t>
             </a:fld>
             <a:endParaRPr lang="en-US"/>
           </a:p>
@@ -5848,7 +5848,7 @@
           <a:p>
             <a:fld id="{02AC24A9-CCB6-4F8D-B8DB-C2F3692CFA5A}" type="datetimeFigureOut">
               <a:rPr lang="en-US" smtClean="0"/>
-              <a:t>12/8/2023</a:t>
+              <a:t>12/12/2023</a:t>
             </a:fld>
             <a:endParaRPr lang="en-US"/>
           </a:p>
@@ -6343,7 +6343,7 @@
           <a:p>
             <a:fld id="{02AC24A9-CCB6-4F8D-B8DB-C2F3692CFA5A}" type="datetimeFigureOut">
               <a:rPr lang="en-US" smtClean="0"/>
-              <a:t>12/8/2023</a:t>
+              <a:t>12/12/2023</a:t>
             </a:fld>
             <a:endParaRPr lang="en-US" dirty="0"/>
           </a:p>
@@ -6820,7 +6820,7 @@
           <a:p>
             <a:fld id="{02AC24A9-CCB6-4F8D-B8DB-C2F3692CFA5A}" type="datetimeFigureOut">
               <a:rPr lang="en-US" smtClean="0"/>
-              <a:t>12/8/2023</a:t>
+              <a:t>12/12/2023</a:t>
             </a:fld>
             <a:endParaRPr lang="en-US"/>
           </a:p>
@@ -7063,7 +7063,7 @@
           <a:p>
             <a:fld id="{02AC24A9-CCB6-4F8D-B8DB-C2F3692CFA5A}" type="datetimeFigureOut">
               <a:rPr lang="en-US" smtClean="0"/>
-              <a:t>12/8/2023</a:t>
+              <a:t>12/12/2023</a:t>
             </a:fld>
             <a:endParaRPr lang="en-US"/>
           </a:p>

</xml_diff>